<commit_message>
Update based on Telco
</commit_message>
<xml_diff>
--- a/SCTP_DTLS_REQ.pptx
+++ b/SCTP_DTLS_REQ.pptx
@@ -7,10 +7,12 @@
   <p:sldIdLst>
     <p:sldId id="256" r:id="rId2"/>
     <p:sldId id="257" r:id="rId3"/>
-    <p:sldId id="258" r:id="rId4"/>
-    <p:sldId id="259" r:id="rId5"/>
-    <p:sldId id="260" r:id="rId6"/>
-    <p:sldId id="261" r:id="rId7"/>
+    <p:sldId id="263" r:id="rId4"/>
+    <p:sldId id="262" r:id="rId5"/>
+    <p:sldId id="258" r:id="rId6"/>
+    <p:sldId id="259" r:id="rId7"/>
+    <p:sldId id="260" r:id="rId8"/>
+    <p:sldId id="261" r:id="rId9"/>
   </p:sldIdLst>
   <p:sldSz cx="12192000" cy="6858000"/>
   <p:notesSz cx="6858000" cy="9144000"/>
@@ -109,6 +111,11 @@
       </a:defRPr>
     </a:lvl9pPr>
   </p:defaultTextStyle>
+  <p:extLst>
+    <p:ext uri="{EFAFB233-063F-42B5-8137-9DF3F51BA10A}">
+      <p15:sldGuideLst xmlns:p15="http://schemas.microsoft.com/office/powerpoint/2012/main"/>
+    </p:ext>
+  </p:extLst>
 </p:presentation>
 </file>
 
@@ -259,7 +266,7 @@
           <a:p>
             <a:fld id="{6533F464-AFE6-B04E-8DF9-709F02B0A2D0}" type="datetimeFigureOut">
               <a:rPr lang="en-US" smtClean="0"/>
-              <a:t>10/25/23</a:t>
+              <a:t>10/27/23</a:t>
             </a:fld>
             <a:endParaRPr lang="en-US"/>
           </a:p>
@@ -457,7 +464,7 @@
           <a:p>
             <a:fld id="{6533F464-AFE6-B04E-8DF9-709F02B0A2D0}" type="datetimeFigureOut">
               <a:rPr lang="en-US" smtClean="0"/>
-              <a:t>10/25/23</a:t>
+              <a:t>10/27/23</a:t>
             </a:fld>
             <a:endParaRPr lang="en-US"/>
           </a:p>
@@ -665,7 +672,7 @@
           <a:p>
             <a:fld id="{6533F464-AFE6-B04E-8DF9-709F02B0A2D0}" type="datetimeFigureOut">
               <a:rPr lang="en-US" smtClean="0"/>
-              <a:t>10/25/23</a:t>
+              <a:t>10/27/23</a:t>
             </a:fld>
             <a:endParaRPr lang="en-US"/>
           </a:p>
@@ -863,7 +870,7 @@
           <a:p>
             <a:fld id="{6533F464-AFE6-B04E-8DF9-709F02B0A2D0}" type="datetimeFigureOut">
               <a:rPr lang="en-US" smtClean="0"/>
-              <a:t>10/25/23</a:t>
+              <a:t>10/27/23</a:t>
             </a:fld>
             <a:endParaRPr lang="en-US"/>
           </a:p>
@@ -1138,7 +1145,7 @@
           <a:p>
             <a:fld id="{6533F464-AFE6-B04E-8DF9-709F02B0A2D0}" type="datetimeFigureOut">
               <a:rPr lang="en-US" smtClean="0"/>
-              <a:t>10/25/23</a:t>
+              <a:t>10/27/23</a:t>
             </a:fld>
             <a:endParaRPr lang="en-US"/>
           </a:p>
@@ -1403,7 +1410,7 @@
           <a:p>
             <a:fld id="{6533F464-AFE6-B04E-8DF9-709F02B0A2D0}" type="datetimeFigureOut">
               <a:rPr lang="en-US" smtClean="0"/>
-              <a:t>10/25/23</a:t>
+              <a:t>10/27/23</a:t>
             </a:fld>
             <a:endParaRPr lang="en-US"/>
           </a:p>
@@ -1815,7 +1822,7 @@
           <a:p>
             <a:fld id="{6533F464-AFE6-B04E-8DF9-709F02B0A2D0}" type="datetimeFigureOut">
               <a:rPr lang="en-US" smtClean="0"/>
-              <a:t>10/25/23</a:t>
+              <a:t>10/27/23</a:t>
             </a:fld>
             <a:endParaRPr lang="en-US"/>
           </a:p>
@@ -1956,7 +1963,7 @@
           <a:p>
             <a:fld id="{6533F464-AFE6-B04E-8DF9-709F02B0A2D0}" type="datetimeFigureOut">
               <a:rPr lang="en-US" smtClean="0"/>
-              <a:t>10/25/23</a:t>
+              <a:t>10/27/23</a:t>
             </a:fld>
             <a:endParaRPr lang="en-US"/>
           </a:p>
@@ -2069,7 +2076,7 @@
           <a:p>
             <a:fld id="{6533F464-AFE6-B04E-8DF9-709F02B0A2D0}" type="datetimeFigureOut">
               <a:rPr lang="en-US" smtClean="0"/>
-              <a:t>10/25/23</a:t>
+              <a:t>10/27/23</a:t>
             </a:fld>
             <a:endParaRPr lang="en-US"/>
           </a:p>
@@ -2380,7 +2387,7 @@
           <a:p>
             <a:fld id="{6533F464-AFE6-B04E-8DF9-709F02B0A2D0}" type="datetimeFigureOut">
               <a:rPr lang="en-US" smtClean="0"/>
-              <a:t>10/25/23</a:t>
+              <a:t>10/27/23</a:t>
             </a:fld>
             <a:endParaRPr lang="en-US"/>
           </a:p>
@@ -2668,7 +2675,7 @@
           <a:p>
             <a:fld id="{6533F464-AFE6-B04E-8DF9-709F02B0A2D0}" type="datetimeFigureOut">
               <a:rPr lang="en-US" smtClean="0"/>
-              <a:t>10/25/23</a:t>
+              <a:t>10/27/23</a:t>
             </a:fld>
             <a:endParaRPr lang="en-US"/>
           </a:p>
@@ -2909,7 +2916,7 @@
           <a:p>
             <a:fld id="{6533F464-AFE6-B04E-8DF9-709F02B0A2D0}" type="datetimeFigureOut">
               <a:rPr lang="en-US" smtClean="0"/>
-              <a:t>10/25/23</a:t>
+              <a:t>10/27/23</a:t>
             </a:fld>
             <a:endParaRPr lang="en-US"/>
           </a:p>
@@ -3763,7 +3770,7 @@
           <p:cNvPr id="2" name="Title 1">
             <a:extLst>
               <a:ext uri="{FF2B5EF4-FFF2-40B4-BE49-F238E27FC236}">
-                <a16:creationId xmlns:a16="http://schemas.microsoft.com/office/drawing/2014/main" id="{564DDCBF-3490-DB5D-1F0D-569D609B9348}"/>
+                <a16:creationId xmlns:a16="http://schemas.microsoft.com/office/drawing/2014/main" id="{7966AE5B-A9EA-BBAF-0264-5D6F1EC0C00D}"/>
               </a:ext>
             </a:extLst>
           </p:cNvPr>
@@ -3781,7 +3788,7 @@
           <a:p>
             <a:r>
               <a:rPr lang="en-US" dirty="0"/>
-              <a:t>Functional Requirements for SCTP</a:t>
+              <a:t>Context</a:t>
             </a:r>
           </a:p>
         </p:txBody>
@@ -3791,7 +3798,7 @@
           <p:cNvPr id="3" name="Content Placeholder 2">
             <a:extLst>
               <a:ext uri="{FF2B5EF4-FFF2-40B4-BE49-F238E27FC236}">
-                <a16:creationId xmlns:a16="http://schemas.microsoft.com/office/drawing/2014/main" id="{B2B83F0E-9D61-AE57-DB66-1C6112D14E26}"/>
+                <a16:creationId xmlns:a16="http://schemas.microsoft.com/office/drawing/2014/main" id="{4457BCEF-D264-FD46-0DD1-92628D059025}"/>
               </a:ext>
             </a:extLst>
           </p:cNvPr>
@@ -3804,79 +3811,46 @@
         </p:nvSpPr>
         <p:spPr/>
         <p:txBody>
-          <a:bodyPr>
-            <a:normAutofit/>
-          </a:bodyPr>
+          <a:bodyPr/>
           <a:lstStyle/>
           <a:p>
             <a:r>
               <a:rPr lang="en-US" dirty="0"/>
-              <a:t>Features from the base specification</a:t>
-            </a:r>
-          </a:p>
-          <a:p>
-            <a:pPr lvl="1"/>
+              <a:t>RFC 6083bis required.</a:t>
+            </a:r>
+          </a:p>
+          <a:p>
             <a:r>
               <a:rPr lang="en-US" dirty="0"/>
-              <a:t>Ordered reliable transmission of user messages</a:t>
-            </a:r>
-          </a:p>
-          <a:p>
-            <a:pPr lvl="1"/>
+              <a:t>Currently using </a:t>
+            </a:r>
+            <a:r>
+              <a:rPr lang="en-US" dirty="0" err="1"/>
+              <a:t>IPSec</a:t>
+            </a:r>
             <a:r>
               <a:rPr lang="en-US" dirty="0"/>
-              <a:t>Multihoming but no dynamic address reconfiguration</a:t>
-            </a:r>
-          </a:p>
-          <a:p>
-            <a:pPr lvl="1"/>
+              <a:t>.</a:t>
+            </a:r>
+          </a:p>
+          <a:p>
             <a:r>
               <a:rPr lang="en-US" dirty="0"/>
-              <a:t>Restart procedure</a:t>
+              <a:t>With the upcoming deployment of signaling nodes in the cloud, this is not sufficient anymore.</a:t>
             </a:r>
           </a:p>
           <a:p>
             <a:r>
               <a:rPr lang="en-US" dirty="0"/>
-              <a:t>Parametrization</a:t>
-            </a:r>
-          </a:p>
-          <a:p>
-            <a:pPr lvl="1"/>
-            <a:r>
-              <a:rPr lang="en-US" dirty="0"/>
-              <a:t>At least two streams</a:t>
-            </a:r>
-          </a:p>
-          <a:p>
-            <a:pPr lvl="1"/>
-            <a:r>
-              <a:rPr lang="en-US" dirty="0"/>
-              <a:t>User message sizes of at least 1 GB (0.5 MB currently in use) supported</a:t>
-            </a:r>
-          </a:p>
-          <a:p>
-            <a:r>
-              <a:rPr lang="en-US" dirty="0"/>
-              <a:t>Constraints</a:t>
-            </a:r>
-          </a:p>
-          <a:p>
-            <a:pPr lvl="1"/>
-            <a:r>
-              <a:rPr lang="en-US" dirty="0"/>
-              <a:t>Protocol mechanisms should not limit availability of communication</a:t>
-            </a:r>
-          </a:p>
-          <a:p>
-            <a:endParaRPr lang="en-US" dirty="0"/>
+              <a:t>3GPP requirements.</a:t>
+            </a:r>
           </a:p>
         </p:txBody>
       </p:sp>
     </p:spTree>
     <p:extLst>
       <p:ext uri="{BB962C8B-B14F-4D97-AF65-F5344CB8AC3E}">
-        <p14:creationId xmlns:p14="http://schemas.microsoft.com/office/powerpoint/2010/main" val="462022126"/>
+        <p14:creationId xmlns:p14="http://schemas.microsoft.com/office/powerpoint/2010/main" val="2567589202"/>
       </p:ext>
     </p:extLst>
   </p:cSld>
@@ -3908,7 +3882,7 @@
           <p:cNvPr id="2" name="Title 1">
             <a:extLst>
               <a:ext uri="{FF2B5EF4-FFF2-40B4-BE49-F238E27FC236}">
-                <a16:creationId xmlns:a16="http://schemas.microsoft.com/office/drawing/2014/main" id="{21F0E716-C137-9156-0322-229C3EDBCFBE}"/>
+                <a16:creationId xmlns:a16="http://schemas.microsoft.com/office/drawing/2014/main" id="{CFBA92E0-DA47-9BC7-07B4-0B4892125A65}"/>
               </a:ext>
             </a:extLst>
           </p:cNvPr>
@@ -3926,7 +3900,7 @@
           <a:p>
             <a:r>
               <a:rPr lang="en-US" dirty="0"/>
-              <a:t>Implementation Considerations for SCTP</a:t>
+              <a:t>Generic Requirements</a:t>
             </a:r>
           </a:p>
         </p:txBody>
@@ -3936,7 +3910,7 @@
           <p:cNvPr id="3" name="Content Placeholder 2">
             <a:extLst>
               <a:ext uri="{FF2B5EF4-FFF2-40B4-BE49-F238E27FC236}">
-                <a16:creationId xmlns:a16="http://schemas.microsoft.com/office/drawing/2014/main" id="{72FEC545-62E9-15BE-6123-69BF4A2396D7}"/>
+                <a16:creationId xmlns:a16="http://schemas.microsoft.com/office/drawing/2014/main" id="{54EDCF88-4DCF-4885-4143-3CAFA160B8F7}"/>
               </a:ext>
             </a:extLst>
           </p:cNvPr>
@@ -3953,37 +3927,22 @@
           <a:lstStyle/>
           <a:p>
             <a:r>
-              <a:rPr lang="en-US" b="0" i="0" u="none" strike="noStrike" dirty="0">
-                <a:solidFill>
-                  <a:srgbClr val="222222"/>
-                </a:solidFill>
-                <a:effectLst/>
-              </a:rPr>
-              <a:t>User message sizes must not be limited by a protocol implementation</a:t>
-            </a:r>
-          </a:p>
-          <a:p>
-            <a:pPr algn="l">
-              <a:buFont typeface="Arial" panose="020B0604020202020204" pitchFamily="34" charset="0"/>
-              <a:buChar char="•"/>
-            </a:pPr>
-            <a:r>
-              <a:rPr lang="en-US" dirty="0">
-                <a:effectLst/>
-              </a:rPr>
-              <a:t>For some participants it is preferred to be able to use open-source kernel SCTP implementations</a:t>
-            </a:r>
-            <a:br>
               <a:rPr lang="en-US" dirty="0"/>
-            </a:br>
-            <a:endParaRPr lang="en-US" dirty="0"/>
+              <a:t>Protocol mechanisms should not limit availability of communication or result in message loss.</a:t>
+            </a:r>
+          </a:p>
+          <a:p>
+            <a:r>
+              <a:rPr lang="en-US" dirty="0"/>
+              <a:t>User message sizes of at least 1 GB (0.5 MB currently in use) supported, if unlimited is not feasible.</a:t>
+            </a:r>
           </a:p>
         </p:txBody>
       </p:sp>
     </p:spTree>
     <p:extLst>
       <p:ext uri="{BB962C8B-B14F-4D97-AF65-F5344CB8AC3E}">
-        <p14:creationId xmlns:p14="http://schemas.microsoft.com/office/powerpoint/2010/main" val="211260678"/>
+        <p14:creationId xmlns:p14="http://schemas.microsoft.com/office/powerpoint/2010/main" val="3134106148"/>
       </p:ext>
     </p:extLst>
   </p:cSld>
@@ -4015,6 +3974,240 @@
           <p:cNvPr id="2" name="Title 1">
             <a:extLst>
               <a:ext uri="{FF2B5EF4-FFF2-40B4-BE49-F238E27FC236}">
+                <a16:creationId xmlns:a16="http://schemas.microsoft.com/office/drawing/2014/main" id="{564DDCBF-3490-DB5D-1F0D-569D609B9348}"/>
+              </a:ext>
+            </a:extLst>
+          </p:cNvPr>
+          <p:cNvSpPr>
+            <a:spLocks noGrp="1"/>
+          </p:cNvSpPr>
+          <p:nvPr>
+            <p:ph type="title"/>
+          </p:nvPr>
+        </p:nvSpPr>
+        <p:spPr/>
+        <p:txBody>
+          <a:bodyPr/>
+          <a:lstStyle/>
+          <a:p>
+            <a:r>
+              <a:rPr lang="en-US" dirty="0"/>
+              <a:t>Functional Requirements for SCTP</a:t>
+            </a:r>
+          </a:p>
+        </p:txBody>
+      </p:sp>
+      <p:sp>
+        <p:nvSpPr>
+          <p:cNvPr id="3" name="Content Placeholder 2">
+            <a:extLst>
+              <a:ext uri="{FF2B5EF4-FFF2-40B4-BE49-F238E27FC236}">
+                <a16:creationId xmlns:a16="http://schemas.microsoft.com/office/drawing/2014/main" id="{B2B83F0E-9D61-AE57-DB66-1C6112D14E26}"/>
+              </a:ext>
+            </a:extLst>
+          </p:cNvPr>
+          <p:cNvSpPr>
+            <a:spLocks noGrp="1"/>
+          </p:cNvSpPr>
+          <p:nvPr>
+            <p:ph idx="1"/>
+          </p:nvPr>
+        </p:nvSpPr>
+        <p:spPr/>
+        <p:txBody>
+          <a:bodyPr>
+            <a:normAutofit/>
+          </a:bodyPr>
+          <a:lstStyle/>
+          <a:p>
+            <a:r>
+              <a:rPr lang="en-US" dirty="0"/>
+              <a:t>Features from the base specification</a:t>
+            </a:r>
+          </a:p>
+          <a:p>
+            <a:pPr lvl="1"/>
+            <a:r>
+              <a:rPr lang="en-US" dirty="0"/>
+              <a:t>Ordered reliable transmission of user messages</a:t>
+            </a:r>
+          </a:p>
+          <a:p>
+            <a:pPr lvl="1"/>
+            <a:r>
+              <a:rPr lang="en-US" dirty="0"/>
+              <a:t>Multihoming, but no dynamic address reconfiguration</a:t>
+            </a:r>
+          </a:p>
+          <a:p>
+            <a:pPr lvl="1"/>
+            <a:r>
+              <a:rPr lang="en-US" dirty="0"/>
+              <a:t>Restart procedure</a:t>
+            </a:r>
+          </a:p>
+          <a:p>
+            <a:r>
+              <a:rPr lang="en-US" dirty="0"/>
+              <a:t>Parametrization</a:t>
+            </a:r>
+          </a:p>
+          <a:p>
+            <a:pPr lvl="1"/>
+            <a:r>
+              <a:rPr lang="en-US" dirty="0"/>
+              <a:t>At least two SCTP streams available to </a:t>
+            </a:r>
+            <a:r>
+              <a:rPr lang="en-US"/>
+              <a:t>the application</a:t>
+            </a:r>
+            <a:endParaRPr lang="en-US" dirty="0"/>
+          </a:p>
+        </p:txBody>
+      </p:sp>
+    </p:spTree>
+    <p:extLst>
+      <p:ext uri="{BB962C8B-B14F-4D97-AF65-F5344CB8AC3E}">
+        <p14:creationId xmlns:p14="http://schemas.microsoft.com/office/powerpoint/2010/main" val="462022126"/>
+      </p:ext>
+    </p:extLst>
+  </p:cSld>
+  <p:clrMapOvr>
+    <a:masterClrMapping/>
+  </p:clrMapOvr>
+</p:sld>
+</file>
+
+<file path=ppt/slides/slide6.xml><?xml version="1.0" encoding="utf-8"?>
+<p:sld xmlns:a="http://schemas.openxmlformats.org/drawingml/2006/main" xmlns:r="http://schemas.openxmlformats.org/officeDocument/2006/relationships" xmlns:p="http://schemas.openxmlformats.org/presentationml/2006/main">
+  <p:cSld>
+    <p:spTree>
+      <p:nvGrpSpPr>
+        <p:cNvPr id="1" name=""/>
+        <p:cNvGrpSpPr/>
+        <p:nvPr/>
+      </p:nvGrpSpPr>
+      <p:grpSpPr>
+        <a:xfrm>
+          <a:off x="0" y="0"/>
+          <a:ext cx="0" cy="0"/>
+          <a:chOff x="0" y="0"/>
+          <a:chExt cx="0" cy="0"/>
+        </a:xfrm>
+      </p:grpSpPr>
+      <p:sp>
+        <p:nvSpPr>
+          <p:cNvPr id="2" name="Title 1">
+            <a:extLst>
+              <a:ext uri="{FF2B5EF4-FFF2-40B4-BE49-F238E27FC236}">
+                <a16:creationId xmlns:a16="http://schemas.microsoft.com/office/drawing/2014/main" id="{21F0E716-C137-9156-0322-229C3EDBCFBE}"/>
+              </a:ext>
+            </a:extLst>
+          </p:cNvPr>
+          <p:cNvSpPr>
+            <a:spLocks noGrp="1"/>
+          </p:cNvSpPr>
+          <p:nvPr>
+            <p:ph type="title"/>
+          </p:nvPr>
+        </p:nvSpPr>
+        <p:spPr/>
+        <p:txBody>
+          <a:bodyPr/>
+          <a:lstStyle/>
+          <a:p>
+            <a:r>
+              <a:rPr lang="en-US" dirty="0"/>
+              <a:t>Implementation Considerations for SCTP</a:t>
+            </a:r>
+          </a:p>
+        </p:txBody>
+      </p:sp>
+      <p:sp>
+        <p:nvSpPr>
+          <p:cNvPr id="3" name="Content Placeholder 2">
+            <a:extLst>
+              <a:ext uri="{FF2B5EF4-FFF2-40B4-BE49-F238E27FC236}">
+                <a16:creationId xmlns:a16="http://schemas.microsoft.com/office/drawing/2014/main" id="{72FEC545-62E9-15BE-6123-69BF4A2396D7}"/>
+              </a:ext>
+            </a:extLst>
+          </p:cNvPr>
+          <p:cNvSpPr>
+            <a:spLocks noGrp="1"/>
+          </p:cNvSpPr>
+          <p:nvPr>
+            <p:ph idx="1"/>
+          </p:nvPr>
+        </p:nvSpPr>
+        <p:spPr/>
+        <p:txBody>
+          <a:bodyPr/>
+          <a:lstStyle/>
+          <a:p>
+            <a:r>
+              <a:rPr lang="en-US" b="0" i="0" u="none" strike="noStrike" dirty="0">
+                <a:solidFill>
+                  <a:srgbClr val="222222"/>
+                </a:solidFill>
+                <a:effectLst/>
+              </a:rPr>
+              <a:t>User message sizes must not be limited by a protocol implementation</a:t>
+            </a:r>
+          </a:p>
+          <a:p>
+            <a:pPr algn="l">
+              <a:buFont typeface="Arial" panose="020B0604020202020204" pitchFamily="34" charset="0"/>
+              <a:buChar char="•"/>
+            </a:pPr>
+            <a:r>
+              <a:rPr lang="en-US" dirty="0">
+                <a:effectLst/>
+              </a:rPr>
+              <a:t>For some participants it is preferred to be able to use open-source kernel SCTP implementations</a:t>
+            </a:r>
+            <a:br>
+              <a:rPr lang="en-US" dirty="0"/>
+            </a:br>
+            <a:endParaRPr lang="en-US" dirty="0"/>
+          </a:p>
+        </p:txBody>
+      </p:sp>
+    </p:spTree>
+    <p:extLst>
+      <p:ext uri="{BB962C8B-B14F-4D97-AF65-F5344CB8AC3E}">
+        <p14:creationId xmlns:p14="http://schemas.microsoft.com/office/powerpoint/2010/main" val="211260678"/>
+      </p:ext>
+    </p:extLst>
+  </p:cSld>
+  <p:clrMapOvr>
+    <a:masterClrMapping/>
+  </p:clrMapOvr>
+</p:sld>
+</file>
+
+<file path=ppt/slides/slide7.xml><?xml version="1.0" encoding="utf-8"?>
+<p:sld xmlns:a="http://schemas.openxmlformats.org/drawingml/2006/main" xmlns:r="http://schemas.openxmlformats.org/officeDocument/2006/relationships" xmlns:p="http://schemas.openxmlformats.org/presentationml/2006/main">
+  <p:cSld>
+    <p:spTree>
+      <p:nvGrpSpPr>
+        <p:cNvPr id="1" name=""/>
+        <p:cNvGrpSpPr/>
+        <p:nvPr/>
+      </p:nvGrpSpPr>
+      <p:grpSpPr>
+        <a:xfrm>
+          <a:off x="0" y="0"/>
+          <a:ext cx="0" cy="0"/>
+          <a:chOff x="0" y="0"/>
+          <a:chExt cx="0" cy="0"/>
+        </a:xfrm>
+      </p:grpSpPr>
+      <p:sp>
+        <p:nvSpPr>
+          <p:cNvPr id="2" name="Title 1">
+            <a:extLst>
+              <a:ext uri="{FF2B5EF4-FFF2-40B4-BE49-F238E27FC236}">
                 <a16:creationId xmlns:a16="http://schemas.microsoft.com/office/drawing/2014/main" id="{88BD570C-926F-7FA2-2BE6-DDC8641D81B3}"/>
               </a:ext>
             </a:extLst>
@@ -4057,7 +4250,7 @@
         <p:spPr/>
         <p:txBody>
           <a:bodyPr>
-            <a:normAutofit lnSpcReduction="10000"/>
+            <a:normAutofit fontScale="92500" lnSpcReduction="10000"/>
           </a:bodyPr>
           <a:lstStyle/>
           <a:p>
@@ -4069,7 +4262,7 @@
                 <a:effectLst/>
                 <a:latin typeface="Noto Sans" panose="020B0502040504020204" pitchFamily="34" charset="0"/>
               </a:rPr>
-              <a:t>Mutual authentication must be used with periodic re-authentication allowing a certificate update</a:t>
+              <a:t>An on-path attacker being able to replay messages, insert messages, or modify messages is considered.</a:t>
             </a:r>
           </a:p>
           <a:p>
@@ -4081,10 +4274,11 @@
                 <a:effectLst/>
                 <a:latin typeface="Noto Sans" panose="020B0502040504020204" pitchFamily="34" charset="0"/>
               </a:rPr>
-              <a:t>It must the possible to run DH once per hour or every 100GB.</a:t>
-            </a:r>
-          </a:p>
-          <a:p>
+              <a:t>Fundamental</a:t>
+            </a:r>
+          </a:p>
+          <a:p>
+            <a:pPr lvl="1"/>
             <a:r>
               <a:rPr lang="en-US" b="0" i="0" u="none" strike="noStrike" dirty="0">
                 <a:solidFill>
@@ -4093,10 +4287,11 @@
                 <a:effectLst/>
                 <a:latin typeface="Noto Sans" panose="020B0502040504020204" pitchFamily="34" charset="0"/>
               </a:rPr>
-              <a:t>Privacy and integrity is required for user data.</a:t>
-            </a:r>
-          </a:p>
-          <a:p>
+              <a:t>Mutual authentication</a:t>
+            </a:r>
+          </a:p>
+          <a:p>
+            <a:pPr lvl="1"/>
             <a:r>
               <a:rPr lang="en-US" b="0" i="0" u="none" strike="noStrike" dirty="0">
                 <a:solidFill>
@@ -4105,12 +4300,100 @@
                 <a:effectLst/>
                 <a:latin typeface="Noto Sans" panose="020B0502040504020204" pitchFamily="34" charset="0"/>
               </a:rPr>
-              <a:t>An on-path attacker being able to replay messages, insert messages, or modify messages must not be able to affect the availability of the association or change user data.</a:t>
-            </a:r>
-          </a:p>
-          <a:p>
-            <a:r>
-              <a:rPr lang="en-US" b="0" i="0" u="none" strike="noStrike">
+              <a:t>Privacy and integrity is required for user data</a:t>
+            </a:r>
+          </a:p>
+          <a:p>
+            <a:r>
+              <a:rPr lang="en-US" dirty="0">
+                <a:solidFill>
+                  <a:srgbClr val="222222"/>
+                </a:solidFill>
+                <a:latin typeface="Noto Sans" panose="020B0502040504020204" pitchFamily="34" charset="0"/>
+              </a:rPr>
+              <a:t>Best practices for long lived sessions</a:t>
+            </a:r>
+            <a:endParaRPr lang="en-US" b="0" i="0" u="none" strike="noStrike" dirty="0">
+              <a:solidFill>
+                <a:srgbClr val="222222"/>
+              </a:solidFill>
+              <a:effectLst/>
+              <a:latin typeface="Noto Sans" panose="020B0502040504020204" pitchFamily="34" charset="0"/>
+            </a:endParaRPr>
+          </a:p>
+          <a:p>
+            <a:pPr lvl="1"/>
+            <a:r>
+              <a:rPr lang="en-US" dirty="0">
+                <a:solidFill>
+                  <a:srgbClr val="222222"/>
+                </a:solidFill>
+                <a:latin typeface="Noto Sans" panose="020B0502040504020204" pitchFamily="34" charset="0"/>
+              </a:rPr>
+              <a:t>P</a:t>
+            </a:r>
+            <a:r>
+              <a:rPr lang="en-US" b="0" i="0" u="none" strike="noStrike" dirty="0">
+                <a:solidFill>
+                  <a:srgbClr val="222222"/>
+                </a:solidFill>
+                <a:effectLst/>
+                <a:latin typeface="Noto Sans" panose="020B0502040504020204" pitchFamily="34" charset="0"/>
+              </a:rPr>
+              <a:t>eriodic re-authentication, for example allowing a certificate update</a:t>
+            </a:r>
+          </a:p>
+          <a:p>
+            <a:pPr lvl="1"/>
+            <a:r>
+              <a:rPr lang="en-US" b="0" i="0" u="none" strike="noStrike" dirty="0">
+                <a:solidFill>
+                  <a:srgbClr val="222222"/>
+                </a:solidFill>
+                <a:effectLst/>
+                <a:latin typeface="Noto Sans" panose="020B0502040504020204" pitchFamily="34" charset="0"/>
+              </a:rPr>
+              <a:t>It must the possible to run DH once per hour or every 100GB</a:t>
+            </a:r>
+          </a:p>
+          <a:p>
+            <a:r>
+              <a:rPr lang="en-US" b="0" i="0" u="none" strike="noStrike" dirty="0">
+                <a:solidFill>
+                  <a:srgbClr val="222222"/>
+                </a:solidFill>
+                <a:effectLst/>
+                <a:latin typeface="Noto Sans" panose="020B0502040504020204" pitchFamily="34" charset="0"/>
+              </a:rPr>
+              <a:t>Availability</a:t>
+            </a:r>
+          </a:p>
+          <a:p>
+            <a:pPr lvl="1"/>
+            <a:r>
+              <a:rPr lang="en-US" dirty="0">
+                <a:solidFill>
+                  <a:srgbClr val="222222"/>
+                </a:solidFill>
+                <a:latin typeface="Noto Sans" panose="020B0502040504020204" pitchFamily="34" charset="0"/>
+              </a:rPr>
+              <a:t>Replay or injection must not </a:t>
+            </a:r>
+            <a:r>
+              <a:rPr lang="en-US" b="0" i="0" u="none" strike="noStrike" dirty="0">
+                <a:solidFill>
+                  <a:srgbClr val="222222"/>
+                </a:solidFill>
+                <a:effectLst/>
+                <a:latin typeface="Noto Sans" panose="020B0502040504020204" pitchFamily="34" charset="0"/>
+              </a:rPr>
+              <a:t>affect the availability of the association.</a:t>
+            </a:r>
+          </a:p>
+          <a:p>
+            <a:pPr lvl="1"/>
+            <a:r>
+              <a:rPr lang="en-US" b="0" i="0" u="none" strike="noStrike" dirty="0">
                 <a:solidFill>
                   <a:srgbClr val="222222"/>
                 </a:solidFill>
@@ -4135,7 +4418,7 @@
 </p:sld>
 </file>
 
-<file path=ppt/slides/slide6.xml><?xml version="1.0" encoding="utf-8"?>
+<file path=ppt/slides/slide8.xml><?xml version="1.0" encoding="utf-8"?>
 <p:sld xmlns:a="http://schemas.openxmlformats.org/drawingml/2006/main" xmlns:r="http://schemas.openxmlformats.org/officeDocument/2006/relationships" xmlns:p="http://schemas.openxmlformats.org/presentationml/2006/main">
   <p:cSld>
     <p:spTree>

</xml_diff>

<commit_message>
Update based on last discussion
</commit_message>
<xml_diff>
--- a/SCTP_DTLS_REQ.pptx
+++ b/SCTP_DTLS_REQ.pptx
@@ -204,7 +204,7 @@
           <a:p>
             <a:fld id="{108AD09B-7AB8-CC42-A1BA-7C68369AC918}" type="datetimeFigureOut">
               <a:rPr lang="en-US" smtClean="0"/>
-              <a:t>10/27/23</a:t>
+              <a:t>11/17/23</a:t>
             </a:fld>
             <a:endParaRPr lang="en-US"/>
           </a:p>
@@ -618,7 +618,7 @@
           <a:p>
             <a:fld id="{A8F7BD6E-364A-514B-905D-15DBF3E67648}" type="datetime1">
               <a:rPr lang="en-US" smtClean="0"/>
-              <a:t>10/27/23</a:t>
+              <a:t>11/17/23</a:t>
             </a:fld>
             <a:endParaRPr lang="en-US"/>
           </a:p>
@@ -816,7 +816,7 @@
           <a:p>
             <a:fld id="{F61C2FBE-B8D6-D547-9282-9EC77743BC0A}" type="datetime1">
               <a:rPr lang="en-US" smtClean="0"/>
-              <a:t>10/27/23</a:t>
+              <a:t>11/17/23</a:t>
             </a:fld>
             <a:endParaRPr lang="en-US"/>
           </a:p>
@@ -1024,7 +1024,7 @@
           <a:p>
             <a:fld id="{C531A4A5-E0CC-6A44-8D5B-7470DEE9150D}" type="datetime1">
               <a:rPr lang="en-US" smtClean="0"/>
-              <a:t>10/27/23</a:t>
+              <a:t>11/17/23</a:t>
             </a:fld>
             <a:endParaRPr lang="en-US"/>
           </a:p>
@@ -1222,7 +1222,7 @@
           <a:p>
             <a:fld id="{0FD05AA0-7A0A-A240-95B0-41C4FC7FEF3F}" type="datetime1">
               <a:rPr lang="en-US" smtClean="0"/>
-              <a:t>10/27/23</a:t>
+              <a:t>11/17/23</a:t>
             </a:fld>
             <a:endParaRPr lang="en-US"/>
           </a:p>
@@ -1497,7 +1497,7 @@
           <a:p>
             <a:fld id="{492F5F67-E4E1-0B46-A541-0286580506DC}" type="datetime1">
               <a:rPr lang="en-US" smtClean="0"/>
-              <a:t>10/27/23</a:t>
+              <a:t>11/17/23</a:t>
             </a:fld>
             <a:endParaRPr lang="en-US"/>
           </a:p>
@@ -1762,7 +1762,7 @@
           <a:p>
             <a:fld id="{CD6E3338-B931-A843-9726-3D4933BBE2B6}" type="datetime1">
               <a:rPr lang="en-US" smtClean="0"/>
-              <a:t>10/27/23</a:t>
+              <a:t>11/17/23</a:t>
             </a:fld>
             <a:endParaRPr lang="en-US"/>
           </a:p>
@@ -2174,7 +2174,7 @@
           <a:p>
             <a:fld id="{998F852E-6523-104E-943C-AD0A8BADDFF7}" type="datetime1">
               <a:rPr lang="en-US" smtClean="0"/>
-              <a:t>10/27/23</a:t>
+              <a:t>11/17/23</a:t>
             </a:fld>
             <a:endParaRPr lang="en-US"/>
           </a:p>
@@ -2315,7 +2315,7 @@
           <a:p>
             <a:fld id="{00715B09-F454-1B43-BA14-0C163C35D17B}" type="datetime1">
               <a:rPr lang="en-US" smtClean="0"/>
-              <a:t>10/27/23</a:t>
+              <a:t>11/17/23</a:t>
             </a:fld>
             <a:endParaRPr lang="en-US"/>
           </a:p>
@@ -2428,7 +2428,7 @@
           <a:p>
             <a:fld id="{45D3E245-F198-854E-AE1F-11D9862087BE}" type="datetime1">
               <a:rPr lang="en-US" smtClean="0"/>
-              <a:t>10/27/23</a:t>
+              <a:t>11/17/23</a:t>
             </a:fld>
             <a:endParaRPr lang="en-US"/>
           </a:p>
@@ -2739,7 +2739,7 @@
           <a:p>
             <a:fld id="{1CDA9BB8-81E0-C14F-B5A7-21E310CC6BEA}" type="datetime1">
               <a:rPr lang="en-US" smtClean="0"/>
-              <a:t>10/27/23</a:t>
+              <a:t>11/17/23</a:t>
             </a:fld>
             <a:endParaRPr lang="en-US"/>
           </a:p>
@@ -3027,7 +3027,7 @@
           <a:p>
             <a:fld id="{35BD4846-0B22-E244-9BD2-C2A2A852C121}" type="datetime1">
               <a:rPr lang="en-US" smtClean="0"/>
-              <a:t>10/27/23</a:t>
+              <a:t>11/17/23</a:t>
             </a:fld>
             <a:endParaRPr lang="en-US"/>
           </a:p>
@@ -3268,7 +3268,7 @@
           <a:p>
             <a:fld id="{C37BE4AB-D615-A94C-AEE2-AC91B9864A50}" type="datetime1">
               <a:rPr lang="en-US" smtClean="0"/>
-              <a:t>10/27/23</a:t>
+              <a:t>11/17/23</a:t>
             </a:fld>
             <a:endParaRPr lang="en-US"/>
           </a:p>
@@ -4339,13 +4339,17 @@
           <a:p>
             <a:r>
               <a:rPr lang="en-US" dirty="0"/>
-              <a:t>Protocol mechanisms should not limit availability of communication or result in message loss.</a:t>
-            </a:r>
-          </a:p>
-          <a:p>
+              <a:t>Protocol mechanisms should not limit availability of communication or result in (reliable) user message loss. (MUST)</a:t>
+            </a:r>
+          </a:p>
+          <a:p>
+            <a:r>
+              <a:rPr lang="en-US" dirty="0" err="1"/>
+              <a:t>Signalling</a:t>
+            </a:r>
             <a:r>
               <a:rPr lang="en-US" dirty="0"/>
-              <a:t>User message sizes of at least 1 GB (0.5 MB currently in use) supported, if unlimited is not feasible.</a:t>
+              <a:t> message sizes of at least 1 GB (0.5 MB currently in use) supported, if unlimited is not feasible. (MUST)</a:t>
             </a:r>
           </a:p>
         </p:txBody>
@@ -4469,21 +4473,28 @@
             <a:pPr lvl="1"/>
             <a:r>
               <a:rPr lang="en-US" dirty="0"/>
-              <a:t>Ordered reliable transmission of user messages</a:t>
+              <a:t>Ordered reliable transmission of user messages (MUST)</a:t>
             </a:r>
           </a:p>
           <a:p>
             <a:pPr lvl="1"/>
             <a:r>
               <a:rPr lang="en-US" dirty="0"/>
-              <a:t>Multihoming, but no dynamic address reconfiguration</a:t>
+              <a:t>Multihoming as specified in RFC 6260 (MUST)</a:t>
             </a:r>
           </a:p>
           <a:p>
             <a:pPr lvl="1"/>
             <a:r>
               <a:rPr lang="en-US" dirty="0"/>
-              <a:t>Restart procedure</a:t>
+              <a:t>Dynamic address reconfiguration as specified in RFC ???? (MAY)</a:t>
+            </a:r>
+          </a:p>
+          <a:p>
+            <a:pPr lvl="1"/>
+            <a:r>
+              <a:rPr lang="en-US" dirty="0"/>
+              <a:t>Restart procedure (MUST)</a:t>
             </a:r>
           </a:p>
           <a:p>
@@ -4496,13 +4507,8 @@
             <a:pPr lvl="1"/>
             <a:r>
               <a:rPr lang="en-US" dirty="0"/>
-              <a:t>At least two SCTP streams available to </a:t>
-            </a:r>
-            <a:r>
-              <a:rPr lang="en-US"/>
-              <a:t>the application</a:t>
-            </a:r>
-            <a:endParaRPr lang="en-US" dirty="0"/>
+              <a:t>At least two SCTP streams available to the application (MUST)</a:t>
+            </a:r>
           </a:p>
         </p:txBody>
       </p:sp>
@@ -4611,8 +4617,37 @@
         </p:nvSpPr>
         <p:spPr/>
         <p:txBody>
-          <a:bodyPr/>
-          <a:lstStyle/>
+          <a:bodyPr>
+            <a:normAutofit/>
+          </a:bodyPr>
+          <a:lstStyle/>
+          <a:p>
+            <a:r>
+              <a:rPr lang="en-US" b="0" i="0" u="none" strike="noStrike" dirty="0">
+                <a:solidFill>
+                  <a:srgbClr val="222222"/>
+                </a:solidFill>
+                <a:effectLst/>
+              </a:rPr>
+              <a:t>SCTP_EXPLICT_EOR (SHOULD)</a:t>
+            </a:r>
+          </a:p>
+          <a:p>
+            <a:r>
+              <a:rPr lang="en-US" dirty="0">
+                <a:solidFill>
+                  <a:srgbClr val="222222"/>
+                </a:solidFill>
+              </a:rPr>
+              <a:t>Partial delivery (MUST)</a:t>
+            </a:r>
+            <a:endParaRPr lang="en-US" b="0" i="0" u="none" strike="noStrike" dirty="0">
+              <a:solidFill>
+                <a:srgbClr val="222222"/>
+              </a:solidFill>
+              <a:effectLst/>
+            </a:endParaRPr>
+          </a:p>
           <a:p>
             <a:r>
               <a:rPr lang="en-US" b="0" i="0" u="none" strike="noStrike" dirty="0">
@@ -4625,20 +4660,49 @@
             </a:r>
           </a:p>
           <a:p>
-            <a:pPr algn="l">
-              <a:buFont typeface="Arial" panose="020B0604020202020204" pitchFamily="34" charset="0"/>
-              <a:buChar char="•"/>
-            </a:pPr>
             <a:r>
               <a:rPr lang="en-US" dirty="0">
                 <a:effectLst/>
               </a:rPr>
-              <a:t>For some participants it is preferred to be able to use open-source kernel SCTP implementations</a:t>
-            </a:r>
-            <a:br>
+              <a:t>It is implementable using an SCTP userland stack (MUST)</a:t>
+            </a:r>
+          </a:p>
+          <a:p>
+            <a:r>
               <a:rPr lang="en-US" dirty="0"/>
-            </a:br>
-            <a:endParaRPr lang="en-US" dirty="0"/>
+              <a:t>It is implementable using an SCTP kernel stack (MUST)</a:t>
+            </a:r>
+          </a:p>
+          <a:p>
+            <a:r>
+              <a:rPr lang="en-US" dirty="0"/>
+              <a:t>It is implementable using an open source (not referring to licensing) SCTP stack (SHOULD)</a:t>
+            </a:r>
+          </a:p>
+          <a:p>
+            <a:r>
+              <a:rPr lang="en-US" dirty="0">
+                <a:effectLst/>
+              </a:rPr>
+              <a:t>TBD: </a:t>
+            </a:r>
+            <a:r>
+              <a:rPr lang="en-US" dirty="0"/>
+              <a:t>l</a:t>
+            </a:r>
+            <a:r>
+              <a:rPr lang="en-US" dirty="0">
+                <a:effectLst/>
+              </a:rPr>
+              <a:t>icensin</a:t>
+            </a:r>
+            <a:r>
+              <a:rPr lang="en-US" dirty="0"/>
+              <a:t>g</a:t>
+            </a:r>
+            <a:endParaRPr lang="en-US" dirty="0">
+              <a:effectLst/>
+            </a:endParaRPr>
           </a:p>
         </p:txBody>
       </p:sp>
@@ -4748,7 +4812,7 @@
         <p:spPr/>
         <p:txBody>
           <a:bodyPr>
-            <a:normAutofit fontScale="92500" lnSpcReduction="10000"/>
+            <a:normAutofit fontScale="85000" lnSpcReduction="10000"/>
           </a:bodyPr>
           <a:lstStyle/>
           <a:p>
@@ -4760,7 +4824,7 @@
                 <a:effectLst/>
                 <a:latin typeface="Noto Sans" panose="020B0502040504020204" pitchFamily="34" charset="0"/>
               </a:rPr>
-              <a:t>An on-path attacker being able to replay messages, insert messages, or modify messages is considered.</a:t>
+              <a:t>An on-path attacker being able to replay messages, insert messages, or modify messages is considered. (MUST)</a:t>
             </a:r>
           </a:p>
           <a:p>
@@ -4785,7 +4849,7 @@
                 <a:effectLst/>
                 <a:latin typeface="Noto Sans" panose="020B0502040504020204" pitchFamily="34" charset="0"/>
               </a:rPr>
-              <a:t>Mutual authentication</a:t>
+              <a:t>Mutual authentication (MUST)</a:t>
             </a:r>
           </a:p>
           <a:p>
@@ -4798,7 +4862,7 @@
                 <a:effectLst/>
                 <a:latin typeface="Noto Sans" panose="020B0502040504020204" pitchFamily="34" charset="0"/>
               </a:rPr>
-              <a:t>Privacy and integrity is required for user data</a:t>
+              <a:t>Privacy and integrity is required for user data (MUST)</a:t>
             </a:r>
           </a:p>
           <a:p>
@@ -4838,7 +4902,7 @@
                 <a:effectLst/>
                 <a:latin typeface="Noto Sans" panose="020B0502040504020204" pitchFamily="34" charset="0"/>
               </a:rPr>
-              <a:t>eriodic re-authentication, for example allowing a certificate update</a:t>
+              <a:t>eriodic re-authentication, for example allowing a certificate update (MUST)</a:t>
             </a:r>
           </a:p>
           <a:p>
@@ -4851,7 +4915,7 @@
                 <a:effectLst/>
                 <a:latin typeface="Noto Sans" panose="020B0502040504020204" pitchFamily="34" charset="0"/>
               </a:rPr>
-              <a:t>It must the possible to run DH once per hour or every 100GB</a:t>
+              <a:t>It must the possible to run DH, for example once per hour or every 100GB. (MUST)</a:t>
             </a:r>
           </a:p>
           <a:p>
@@ -4885,7 +4949,7 @@
                 <a:effectLst/>
                 <a:latin typeface="Noto Sans" panose="020B0502040504020204" pitchFamily="34" charset="0"/>
               </a:rPr>
-              <a:t>affect the availability of the association.</a:t>
+              <a:t>affect the availability of the association. (MUST)</a:t>
             </a:r>
           </a:p>
           <a:p>
@@ -4898,7 +4962,7 @@
                 <a:effectLst/>
                 <a:latin typeface="Noto Sans" panose="020B0502040504020204" pitchFamily="34" charset="0"/>
               </a:rPr>
-              <a:t>In particular, the SCTP restart procedure must not allow to take over an SCTP association by an attacker.</a:t>
+              <a:t>In particular, the SCTP restart procedure must not allow to take over an SCTP association by an attacker. (MUST)</a:t>
             </a:r>
           </a:p>
         </p:txBody>
@@ -5013,13 +5077,19 @@
           <a:p>
             <a:r>
               <a:rPr lang="en-US" dirty="0"/>
-              <a:t>Focus on DTLS 1.3</a:t>
+              <a:t>Support DTLS 1.3 (SHOULD)</a:t>
             </a:r>
           </a:p>
           <a:p>
             <a:r>
               <a:rPr lang="en-US" dirty="0"/>
-              <a:t>For some participants it is preferred to use unmodified DTLS implementations</a:t>
+              <a:t>Support DTLS 1.2 (MAY)</a:t>
+            </a:r>
+          </a:p>
+          <a:p>
+            <a:r>
+              <a:rPr lang="en-US" dirty="0"/>
+              <a:t>For some participants it is preferred to use unmodified DTLS implementations (MAY)</a:t>
             </a:r>
           </a:p>
         </p:txBody>

</xml_diff>